<commit_message>
Revert "Merge pull request #51 from reza-arjmandi/day1"
This reverts commit db4f31e3e28a60098c5e4c150b43e8e67cf2e39d, reversing
changes made to c16dd89bdc55f08f5698d2a389ce6d8aa8bda84a.
</commit_message>
<xml_diff>
--- a/session3/presentation/Python_List_And_Dictionaries.pptx
+++ b/session3/presentation/Python_List_And_Dictionaries.pptx
@@ -26,8 +26,7 @@
     <p:sldId id="346" r:id="rId20"/>
     <p:sldId id="348" r:id="rId21"/>
     <p:sldId id="349" r:id="rId22"/>
-    <p:sldId id="371" r:id="rId23"/>
-    <p:sldId id="267" r:id="rId24"/>
+    <p:sldId id="267" r:id="rId23"/>
   </p:sldIdLst>
   <p:sldSz cx="12192000" cy="6858000"/>
   <p:notesSz cx="6858000" cy="9144000"/>
@@ -267,7 +266,7 @@
           <a:p>
             <a:fld id="{1139FA4A-C808-4981-8BA9-64217A6CCEA7}" type="datetimeFigureOut">
               <a:rPr lang="en-US" smtClean="0"/>
-              <a:t>11/30/2017</a:t>
+              <a:t>9/11/2017</a:t>
             </a:fld>
             <a:endParaRPr lang="en-US"/>
           </a:p>
@@ -435,7 +434,7 @@
           <a:p>
             <a:fld id="{1139FA4A-C808-4981-8BA9-64217A6CCEA7}" type="datetimeFigureOut">
               <a:rPr lang="en-US" smtClean="0"/>
-              <a:t>11/30/2017</a:t>
+              <a:t>9/11/2017</a:t>
             </a:fld>
             <a:endParaRPr lang="en-US"/>
           </a:p>
@@ -613,7 +612,7 @@
           <a:p>
             <a:fld id="{1139FA4A-C808-4981-8BA9-64217A6CCEA7}" type="datetimeFigureOut">
               <a:rPr lang="en-US" smtClean="0"/>
-              <a:t>11/30/2017</a:t>
+              <a:t>9/11/2017</a:t>
             </a:fld>
             <a:endParaRPr lang="en-US"/>
           </a:p>
@@ -781,7 +780,7 @@
           <a:p>
             <a:fld id="{1139FA4A-C808-4981-8BA9-64217A6CCEA7}" type="datetimeFigureOut">
               <a:rPr lang="en-US" smtClean="0"/>
-              <a:t>11/30/2017</a:t>
+              <a:t>9/11/2017</a:t>
             </a:fld>
             <a:endParaRPr lang="en-US"/>
           </a:p>
@@ -1026,7 +1025,7 @@
           <a:p>
             <a:fld id="{1139FA4A-C808-4981-8BA9-64217A6CCEA7}" type="datetimeFigureOut">
               <a:rPr lang="en-US" smtClean="0"/>
-              <a:t>11/30/2017</a:t>
+              <a:t>9/11/2017</a:t>
             </a:fld>
             <a:endParaRPr lang="en-US"/>
           </a:p>
@@ -1255,7 +1254,7 @@
           <a:p>
             <a:fld id="{1139FA4A-C808-4981-8BA9-64217A6CCEA7}" type="datetimeFigureOut">
               <a:rPr lang="en-US" smtClean="0"/>
-              <a:t>11/30/2017</a:t>
+              <a:t>9/11/2017</a:t>
             </a:fld>
             <a:endParaRPr lang="en-US"/>
           </a:p>
@@ -1619,7 +1618,7 @@
           <a:p>
             <a:fld id="{1139FA4A-C808-4981-8BA9-64217A6CCEA7}" type="datetimeFigureOut">
               <a:rPr lang="en-US" smtClean="0"/>
-              <a:t>11/30/2017</a:t>
+              <a:t>9/11/2017</a:t>
             </a:fld>
             <a:endParaRPr lang="en-US"/>
           </a:p>
@@ -1736,7 +1735,7 @@
           <a:p>
             <a:fld id="{1139FA4A-C808-4981-8BA9-64217A6CCEA7}" type="datetimeFigureOut">
               <a:rPr lang="en-US" smtClean="0"/>
-              <a:t>11/30/2017</a:t>
+              <a:t>9/11/2017</a:t>
             </a:fld>
             <a:endParaRPr lang="en-US"/>
           </a:p>
@@ -1831,7 +1830,7 @@
           <a:p>
             <a:fld id="{1139FA4A-C808-4981-8BA9-64217A6CCEA7}" type="datetimeFigureOut">
               <a:rPr lang="en-US" smtClean="0"/>
-              <a:t>11/30/2017</a:t>
+              <a:t>9/11/2017</a:t>
             </a:fld>
             <a:endParaRPr lang="en-US"/>
           </a:p>
@@ -2106,7 +2105,7 @@
           <a:p>
             <a:fld id="{1139FA4A-C808-4981-8BA9-64217A6CCEA7}" type="datetimeFigureOut">
               <a:rPr lang="en-US" smtClean="0"/>
-              <a:t>11/30/2017</a:t>
+              <a:t>9/11/2017</a:t>
             </a:fld>
             <a:endParaRPr lang="en-US"/>
           </a:p>
@@ -2358,7 +2357,7 @@
           <a:p>
             <a:fld id="{1139FA4A-C808-4981-8BA9-64217A6CCEA7}" type="datetimeFigureOut">
               <a:rPr lang="en-US" smtClean="0"/>
-              <a:t>11/30/2017</a:t>
+              <a:t>9/11/2017</a:t>
             </a:fld>
             <a:endParaRPr lang="en-US"/>
           </a:p>
@@ -2569,7 +2568,7 @@
           <a:p>
             <a:fld id="{1139FA4A-C808-4981-8BA9-64217A6CCEA7}" type="datetimeFigureOut">
               <a:rPr lang="en-US" smtClean="0"/>
-              <a:t>11/30/2017</a:t>
+              <a:t>9/11/2017</a:t>
             </a:fld>
             <a:endParaRPr lang="en-US"/>
           </a:p>
@@ -3333,7 +3332,7 @@
         <p:spPr>
           <a:xfrm>
             <a:off x="417443" y="857743"/>
-            <a:ext cx="11357113" cy="5386090"/>
+            <a:ext cx="11357113" cy="4462760"/>
           </a:xfrm>
           <a:prstGeom prst="rect">
             <a:avLst/>
@@ -3522,81 +3521,6 @@
               </a:rPr>
               <a:t>&gt;&gt;&gt; </a:t>
             </a:r>
-            <a:endParaRPr lang="en-US" sz="2000" b="1" i="1" dirty="0" smtClean="0">
-              <a:solidFill>
-                <a:srgbClr val="0070C0"/>
-              </a:solidFill>
-              <a:latin typeface="Consolas" panose="020B0609020204030204" pitchFamily="49" charset="0"/>
-              <a:cs typeface="Consolas" panose="020B0609020204030204" pitchFamily="49" charset="0"/>
-            </a:endParaRPr>
-          </a:p>
-          <a:p>
-            <a:pPr lvl="1"/>
-            <a:endParaRPr lang="en-US" sz="2000" b="1" i="1" dirty="0">
-              <a:solidFill>
-                <a:srgbClr val="0070C0"/>
-              </a:solidFill>
-              <a:latin typeface="Consolas" panose="020B0609020204030204" pitchFamily="49" charset="0"/>
-              <a:cs typeface="Consolas" panose="020B0609020204030204" pitchFamily="49" charset="0"/>
-            </a:endParaRPr>
-          </a:p>
-          <a:p>
-            <a:pPr lvl="1"/>
-            <a:endParaRPr lang="en-US" sz="2000" b="1" i="1" dirty="0" smtClean="0">
-              <a:solidFill>
-                <a:srgbClr val="0070C0"/>
-              </a:solidFill>
-              <a:latin typeface="Consolas" panose="020B0609020204030204" pitchFamily="49" charset="0"/>
-              <a:cs typeface="Consolas" panose="020B0609020204030204" pitchFamily="49" charset="0"/>
-            </a:endParaRPr>
-          </a:p>
-          <a:p>
-            <a:pPr lvl="1"/>
-            <a:r>
-              <a:rPr lang="en-US" sz="2000" b="1" i="1" dirty="0" smtClean="0">
-                <a:solidFill>
-                  <a:schemeClr val="accent6">
-                    <a:lumMod val="50000"/>
-                  </a:schemeClr>
-                </a:solidFill>
-                <a:latin typeface="Consolas" panose="020B0609020204030204" pitchFamily="49" charset="0"/>
-                <a:cs typeface="Consolas" panose="020B0609020204030204" pitchFamily="49" charset="0"/>
-              </a:rPr>
-              <a:t>(anaconda using </a:t>
-            </a:r>
-            <a:r>
-              <a:rPr lang="en-US" sz="2000" b="1" i="1" dirty="0" err="1" smtClean="0">
-                <a:solidFill>
-                  <a:schemeClr val="accent6">
-                    <a:lumMod val="50000"/>
-                  </a:schemeClr>
-                </a:solidFill>
-                <a:latin typeface="Consolas" panose="020B0609020204030204" pitchFamily="49" charset="0"/>
-                <a:cs typeface="Consolas" panose="020B0609020204030204" pitchFamily="49" charset="0"/>
-              </a:rPr>
-              <a:t>pypy</a:t>
-            </a:r>
-            <a:r>
-              <a:rPr lang="en-US" sz="2000" b="1" i="1" dirty="0" smtClean="0">
-                <a:solidFill>
-                  <a:schemeClr val="accent6">
-                    <a:lumMod val="50000"/>
-                  </a:schemeClr>
-                </a:solidFill>
-                <a:latin typeface="Consolas" panose="020B0609020204030204" pitchFamily="49" charset="0"/>
-                <a:cs typeface="Consolas" panose="020B0609020204030204" pitchFamily="49" charset="0"/>
-              </a:rPr>
-              <a:t> for compile due max performance)</a:t>
-            </a:r>
-            <a:endParaRPr lang="en-US" sz="2000" b="1" i="1" dirty="0">
-              <a:solidFill>
-                <a:schemeClr val="accent6">
-                  <a:lumMod val="50000"/>
-                </a:schemeClr>
-              </a:solidFill>
-              <a:latin typeface="Consolas" panose="020B0609020204030204" pitchFamily="49" charset="0"/>
-              <a:cs typeface="Consolas" panose="020B0609020204030204" pitchFamily="49" charset="0"/>
-            </a:endParaRPr>
           </a:p>
         </p:txBody>
       </p:sp>
@@ -3827,7 +3751,7 @@
         <p:spPr>
           <a:xfrm>
             <a:off x="417443" y="857743"/>
-            <a:ext cx="11357113" cy="5693866"/>
+            <a:ext cx="11357113" cy="4770537"/>
           </a:xfrm>
           <a:prstGeom prst="rect">
             <a:avLst/>
@@ -4021,7 +3945,7 @@
           <a:p>
             <a:pPr lvl="1"/>
             <a:r>
-              <a:rPr lang="it-IT" sz="2000" b="1" i="1" dirty="0" smtClean="0">
+              <a:rPr lang="it-IT" sz="2000" b="1" i="1" dirty="0">
                 <a:solidFill>
                   <a:srgbClr val="0070C0"/>
                 </a:solidFill>
@@ -4030,64 +3954,6 @@
               </a:rPr>
               <a:t>&gt;&gt;&gt;</a:t>
             </a:r>
-          </a:p>
-          <a:p>
-            <a:pPr lvl="1"/>
-            <a:endParaRPr lang="it-IT" sz="2000" b="1" i="1" dirty="0">
-              <a:solidFill>
-                <a:srgbClr val="0070C0"/>
-              </a:solidFill>
-              <a:latin typeface="Consolas" panose="020B0609020204030204" pitchFamily="49" charset="0"/>
-              <a:cs typeface="Consolas" panose="020B0609020204030204" pitchFamily="49" charset="0"/>
-            </a:endParaRPr>
-          </a:p>
-          <a:p>
-            <a:pPr lvl="1"/>
-            <a:r>
-              <a:rPr lang="fa-IR" sz="2000" dirty="0" smtClean="0">
-                <a:solidFill>
-                  <a:srgbClr val="0070C0"/>
-                </a:solidFill>
-                <a:latin typeface="Tahoma" panose="020B0604030504040204" pitchFamily="34" charset="0"/>
-                <a:ea typeface="Tahoma" panose="020B0604030504040204" pitchFamily="34" charset="0"/>
-                <a:cs typeface="Tahoma" panose="020B0604030504040204" pitchFamily="34" charset="0"/>
-              </a:rPr>
-              <a:t>یک لیست جدید ایجاد میکنه مثل چیزی که چاپ شده</a:t>
-            </a:r>
-          </a:p>
-          <a:p>
-            <a:pPr lvl="1"/>
-            <a:r>
-              <a:rPr lang="en-US" sz="2000" dirty="0" smtClean="0">
-                <a:solidFill>
-                  <a:srgbClr val="0070C0"/>
-                </a:solidFill>
-                <a:latin typeface="Tahoma" panose="020B0604030504040204" pitchFamily="34" charset="0"/>
-                <a:ea typeface="Tahoma" panose="020B0604030504040204" pitchFamily="34" charset="0"/>
-                <a:cs typeface="Tahoma" panose="020B0604030504040204" pitchFamily="34" charset="0"/>
-              </a:rPr>
-              <a:t>For x in enumerate(a) </a:t>
-            </a:r>
-            <a:r>
-              <a:rPr lang="en-US" sz="2000" dirty="0" smtClean="0">
-                <a:solidFill>
-                  <a:srgbClr val="0070C0"/>
-                </a:solidFill>
-                <a:latin typeface="Tahoma" panose="020B0604030504040204" pitchFamily="34" charset="0"/>
-                <a:ea typeface="Tahoma" panose="020B0604030504040204" pitchFamily="34" charset="0"/>
-                <a:cs typeface="Tahoma" panose="020B0604030504040204" pitchFamily="34" charset="0"/>
-                <a:sym typeface="Wingdings" panose="05000000000000000000" pitchFamily="2" charset="2"/>
-              </a:rPr>
-              <a:t> x(0)=(0,34)</a:t>
-            </a:r>
-            <a:endParaRPr lang="fa-IR" sz="2000" dirty="0" smtClean="0">
-              <a:solidFill>
-                <a:srgbClr val="0070C0"/>
-              </a:solidFill>
-              <a:latin typeface="Tahoma" panose="020B0604030504040204" pitchFamily="34" charset="0"/>
-              <a:ea typeface="Tahoma" panose="020B0604030504040204" pitchFamily="34" charset="0"/>
-              <a:cs typeface="Tahoma" panose="020B0604030504040204" pitchFamily="34" charset="0"/>
-            </a:endParaRPr>
           </a:p>
         </p:txBody>
       </p:sp>
@@ -5076,47 +4942,6 @@
               </a:rPr>
               <a:t>&gt;&gt;&gt; </a:t>
             </a:r>
-            <a:r>
-              <a:rPr lang="en-US" b="1" i="1" dirty="0" smtClean="0">
-                <a:solidFill>
-                  <a:srgbClr val="0070C0"/>
-                </a:solidFill>
-                <a:latin typeface="Consolas" panose="020B0609020204030204" pitchFamily="49" charset="0"/>
-                <a:cs typeface="Consolas" panose="020B0609020204030204" pitchFamily="49" charset="0"/>
-              </a:rPr>
-              <a:t>   </a:t>
-            </a:r>
-            <a:r>
-              <a:rPr lang="en-US" b="1" i="1" dirty="0" smtClean="0">
-                <a:solidFill>
-                  <a:schemeClr val="accent6">
-                    <a:lumMod val="50000"/>
-                  </a:schemeClr>
-                </a:solidFill>
-                <a:latin typeface="Consolas" panose="020B0609020204030204" pitchFamily="49" charset="0"/>
-                <a:cs typeface="Consolas" panose="020B0609020204030204" pitchFamily="49" charset="0"/>
-              </a:rPr>
-              <a:t>a=b</a:t>
-            </a:r>
-            <a:r>
-              <a:rPr lang="fa-IR" b="1" i="1" dirty="0" smtClean="0">
-                <a:solidFill>
-                  <a:schemeClr val="accent6">
-                    <a:lumMod val="50000"/>
-                  </a:schemeClr>
-                </a:solidFill>
-                <a:latin typeface="Consolas" panose="020B0609020204030204" pitchFamily="49" charset="0"/>
-                <a:cs typeface="Consolas" panose="020B0609020204030204" pitchFamily="49" charset="0"/>
-              </a:rPr>
-              <a:t> هر دو به یک محل اشاره میکنند و کپی فیزیکی رخ نمیدهد </a:t>
-            </a:r>
-            <a:endParaRPr lang="en-US" b="1" i="1" dirty="0">
-              <a:solidFill>
-                <a:srgbClr val="0070C0"/>
-              </a:solidFill>
-              <a:latin typeface="Consolas" panose="020B0609020204030204" pitchFamily="49" charset="0"/>
-              <a:cs typeface="Consolas" panose="020B0609020204030204" pitchFamily="49" charset="0"/>
-            </a:endParaRPr>
           </a:p>
           <a:p>
             <a:pPr marL="342900" indent="-342900">
@@ -6354,85 +6179,6 @@
               </a:rPr>
               <a:t>() for x in l] </a:t>
             </a:r>
-            <a:r>
-              <a:rPr lang="fa-IR" sz="2000" b="1" i="1" dirty="0" smtClean="0">
-                <a:solidFill>
-                  <a:srgbClr val="0070C0"/>
-                </a:solidFill>
-                <a:latin typeface="Consolas" panose="020B0609020204030204" pitchFamily="49" charset="0"/>
-                <a:cs typeface="Consolas" panose="020B0609020204030204" pitchFamily="49" charset="0"/>
-              </a:rPr>
-              <a:t>    </a:t>
-            </a:r>
-            <a:r>
-              <a:rPr lang="en-US" sz="2000" b="1" dirty="0" smtClean="0">
-                <a:solidFill>
-                  <a:schemeClr val="accent6">
-                    <a:lumMod val="50000"/>
-                  </a:schemeClr>
-                </a:solidFill>
-                <a:latin typeface="Consolas" panose="020B0609020204030204" pitchFamily="49" charset="0"/>
-                <a:cs typeface="Consolas" panose="020B0609020204030204" pitchFamily="49" charset="0"/>
-              </a:rPr>
-              <a:t>or (a=</a:t>
-            </a:r>
-            <a:r>
-              <a:rPr lang="en-US" sz="2000" b="1" i="1" dirty="0" smtClean="0">
-                <a:solidFill>
-                  <a:schemeClr val="accent6">
-                    <a:lumMod val="50000"/>
-                  </a:schemeClr>
-                </a:solidFill>
-                <a:latin typeface="Consolas" panose="020B0609020204030204" pitchFamily="49" charset="0"/>
-                <a:cs typeface="Consolas" panose="020B0609020204030204" pitchFamily="49" charset="0"/>
-              </a:rPr>
-              <a:t>[</a:t>
-            </a:r>
-            <a:r>
-              <a:rPr lang="en-US" sz="2000" b="1" i="1" dirty="0" err="1">
-                <a:solidFill>
-                  <a:schemeClr val="accent6">
-                    <a:lumMod val="50000"/>
-                  </a:schemeClr>
-                </a:solidFill>
-                <a:latin typeface="Consolas" panose="020B0609020204030204" pitchFamily="49" charset="0"/>
-                <a:cs typeface="Consolas" panose="020B0609020204030204" pitchFamily="49" charset="0"/>
-              </a:rPr>
-              <a:t>x.upper</a:t>
-            </a:r>
-            <a:r>
-              <a:rPr lang="en-US" sz="2000" b="1" i="1" dirty="0">
-                <a:solidFill>
-                  <a:schemeClr val="accent6">
-                    <a:lumMod val="50000"/>
-                  </a:schemeClr>
-                </a:solidFill>
-                <a:latin typeface="Consolas" panose="020B0609020204030204" pitchFamily="49" charset="0"/>
-                <a:cs typeface="Consolas" panose="020B0609020204030204" pitchFamily="49" charset="0"/>
-              </a:rPr>
-              <a:t>() for x in l</a:t>
-            </a:r>
-            <a:r>
-              <a:rPr lang="en-US" sz="2000" b="1" i="1" dirty="0" smtClean="0">
-                <a:solidFill>
-                  <a:schemeClr val="accent6">
-                    <a:lumMod val="50000"/>
-                  </a:schemeClr>
-                </a:solidFill>
-                <a:latin typeface="Consolas" panose="020B0609020204030204" pitchFamily="49" charset="0"/>
-                <a:cs typeface="Consolas" panose="020B0609020204030204" pitchFamily="49" charset="0"/>
-              </a:rPr>
-              <a:t>])</a:t>
-            </a:r>
-            <a:endParaRPr lang="en-US" sz="2000" b="1" i="1" dirty="0">
-              <a:solidFill>
-                <a:schemeClr val="accent6">
-                  <a:lumMod val="50000"/>
-                </a:schemeClr>
-              </a:solidFill>
-              <a:latin typeface="Consolas" panose="020B0609020204030204" pitchFamily="49" charset="0"/>
-              <a:cs typeface="Consolas" panose="020B0609020204030204" pitchFamily="49" charset="0"/>
-            </a:endParaRPr>
           </a:p>
           <a:p>
             <a:pPr marL="342900" indent="-342900">
@@ -9231,35 +8977,8 @@
                 <a:latin typeface="Consolas" panose="020B0609020204030204" pitchFamily="49" charset="0"/>
                 <a:cs typeface="Consolas" panose="020B0609020204030204" pitchFamily="49" charset="0"/>
               </a:rPr>
-              <a:t>...     </a:t>
-            </a:r>
-            <a:r>
-              <a:rPr lang="en-US" b="1" i="1">
-                <a:solidFill>
-                  <a:srgbClr val="0070C0"/>
-                </a:solidFill>
-                <a:latin typeface="Consolas" panose="020B0609020204030204" pitchFamily="49" charset="0"/>
-                <a:cs typeface="Consolas" panose="020B0609020204030204" pitchFamily="49" charset="0"/>
-              </a:rPr>
-              <a:t>print(name</a:t>
-            </a:r>
-            <a:r>
-              <a:rPr lang="en-US" b="1" i="1" smtClean="0">
-                <a:solidFill>
-                  <a:srgbClr val="0070C0"/>
-                </a:solidFill>
-                <a:latin typeface="Consolas" panose="020B0609020204030204" pitchFamily="49" charset="0"/>
-                <a:cs typeface="Consolas" panose="020B0609020204030204" pitchFamily="49" charset="0"/>
-              </a:rPr>
-              <a:t>)</a:t>
-            </a:r>
-            <a:endParaRPr lang="en-US" b="1" i="1" dirty="0">
-              <a:solidFill>
-                <a:srgbClr val="0070C0"/>
-              </a:solidFill>
-              <a:latin typeface="Consolas" panose="020B0609020204030204" pitchFamily="49" charset="0"/>
-              <a:cs typeface="Consolas" panose="020B0609020204030204" pitchFamily="49" charset="0"/>
-            </a:endParaRPr>
+              <a:t>...     print(name) </a:t>
+            </a:r>
           </a:p>
           <a:p>
             <a:pPr marL="342900" indent="-342900">
@@ -9564,75 +9283,6 @@
 </file>
 
 <file path=ppt/slides/slide22.xml><?xml version="1.0" encoding="utf-8"?>
-<p:sld xmlns:a="http://schemas.openxmlformats.org/drawingml/2006/main" xmlns:r="http://schemas.openxmlformats.org/officeDocument/2006/relationships" xmlns:p="http://schemas.openxmlformats.org/presentationml/2006/main">
-  <p:cSld>
-    <p:spTree>
-      <p:nvGrpSpPr>
-        <p:cNvPr id="1" name=""/>
-        <p:cNvGrpSpPr/>
-        <p:nvPr/>
-      </p:nvGrpSpPr>
-      <p:grpSpPr>
-        <a:xfrm>
-          <a:off x="0" y="0"/>
-          <a:ext cx="0" cy="0"/>
-          <a:chOff x="0" y="0"/>
-          <a:chExt cx="0" cy="0"/>
-        </a:xfrm>
-      </p:grpSpPr>
-      <p:sp>
-        <p:nvSpPr>
-          <p:cNvPr id="2" name="Title 1"/>
-          <p:cNvSpPr>
-            <a:spLocks noGrp="1"/>
-          </p:cNvSpPr>
-          <p:nvPr>
-            <p:ph type="title"/>
-          </p:nvPr>
-        </p:nvSpPr>
-        <p:spPr/>
-        <p:txBody>
-          <a:bodyPr/>
-          <a:lstStyle/>
-          <a:p>
-            <a:pPr algn="ctr"/>
-            <a:r>
-              <a:rPr lang="en-US" dirty="0" smtClean="0"/>
-              <a:t>Infinite </a:t>
-            </a:r>
-            <a:r>
-              <a:rPr lang="en-US" dirty="0" err="1" smtClean="0"/>
-              <a:t>itrerator</a:t>
-            </a:r>
-            <a:r>
-              <a:rPr lang="en-US" dirty="0" smtClean="0"/>
-              <a:t/>
-            </a:r>
-            <a:br>
-              <a:rPr lang="en-US" dirty="0" smtClean="0"/>
-            </a:br>
-            <a:r>
-              <a:rPr lang="fa-IR" dirty="0" smtClean="0"/>
-              <a:t>خوانده شود</a:t>
-            </a:r>
-            <a:endParaRPr lang="en-US" dirty="0"/>
-          </a:p>
-        </p:txBody>
-      </p:sp>
-    </p:spTree>
-    <p:extLst>
-      <p:ext uri="{BB962C8B-B14F-4D97-AF65-F5344CB8AC3E}">
-        <p14:creationId xmlns:p14="http://schemas.microsoft.com/office/powerpoint/2010/main" val="3958008484"/>
-      </p:ext>
-    </p:extLst>
-  </p:cSld>
-  <p:clrMapOvr>
-    <a:masterClrMapping/>
-  </p:clrMapOvr>
-</p:sld>
-</file>
-
-<file path=ppt/slides/slide23.xml><?xml version="1.0" encoding="utf-8"?>
 <p:sld xmlns:a="http://schemas.openxmlformats.org/drawingml/2006/main" xmlns:r="http://schemas.openxmlformats.org/officeDocument/2006/relationships" xmlns:p="http://schemas.openxmlformats.org/presentationml/2006/main">
   <p:cSld>
     <p:spTree>

</xml_diff>